<commit_message>
Updated I3S Version to 1.6; renamed texture resources to reflect content type
</commit_message>
<xml_diff>
--- a/format/uml/SpecificationFigures.pptx
+++ b/format/uml/SpecificationFigures.pptx
@@ -212,7 +212,7 @@
           <a:p>
             <a:fld id="{DBD45C97-1077-4622-A936-229BE89647D5}" type="datetimeFigureOut">
               <a:rPr lang="de-CH" smtClean="0"/>
-              <a:t>14.09.2016</a:t>
+              <a:t>30.09.2016</a:t>
             </a:fld>
             <a:endParaRPr lang="de-CH"/>
           </a:p>
@@ -661,7 +661,7 @@
           <a:p>
             <a:fld id="{8477DB91-D4F4-47C0-BB7C-05B39326A595}" type="datetimeFigureOut">
               <a:rPr lang="de-CH" smtClean="0"/>
-              <a:t>14.09.2016</a:t>
+              <a:t>30.09.2016</a:t>
             </a:fld>
             <a:endParaRPr lang="de-CH"/>
           </a:p>
@@ -831,7 +831,7 @@
           <a:p>
             <a:fld id="{8477DB91-D4F4-47C0-BB7C-05B39326A595}" type="datetimeFigureOut">
               <a:rPr lang="de-CH" smtClean="0"/>
-              <a:t>14.09.2016</a:t>
+              <a:t>30.09.2016</a:t>
             </a:fld>
             <a:endParaRPr lang="de-CH"/>
           </a:p>
@@ -1011,7 +1011,7 @@
           <a:p>
             <a:fld id="{8477DB91-D4F4-47C0-BB7C-05B39326A595}" type="datetimeFigureOut">
               <a:rPr lang="de-CH" smtClean="0"/>
-              <a:t>14.09.2016</a:t>
+              <a:t>30.09.2016</a:t>
             </a:fld>
             <a:endParaRPr lang="de-CH"/>
           </a:p>
@@ -1210,7 +1210,7 @@
                 </a:solidFill>
               </a:rPr>
               <a:pPr/>
-              <a:t>9/14/2016</a:t>
+              <a:t>9/30/2016</a:t>
             </a:fld>
             <a:endParaRPr lang="en-US">
               <a:solidFill>
@@ -1412,7 +1412,7 @@
                 </a:solidFill>
               </a:rPr>
               <a:pPr/>
-              <a:t>9/14/2016</a:t>
+              <a:t>9/30/2016</a:t>
             </a:fld>
             <a:endParaRPr lang="en-US">
               <a:solidFill>
@@ -1690,7 +1690,7 @@
                 </a:solidFill>
               </a:rPr>
               <a:pPr/>
-              <a:t>9/14/2016</a:t>
+              <a:t>9/30/2016</a:t>
             </a:fld>
             <a:endParaRPr lang="en-US">
               <a:solidFill>
@@ -1954,7 +1954,7 @@
                 </a:solidFill>
               </a:rPr>
               <a:pPr/>
-              <a:t>9/14/2016</a:t>
+              <a:t>9/30/2016</a:t>
             </a:fld>
             <a:endParaRPr lang="en-US">
               <a:solidFill>
@@ -2353,7 +2353,7 @@
                 </a:solidFill>
               </a:rPr>
               <a:pPr/>
-              <a:t>9/14/2016</a:t>
+              <a:t>9/30/2016</a:t>
             </a:fld>
             <a:endParaRPr lang="en-US">
               <a:solidFill>
@@ -2503,7 +2503,7 @@
                 </a:solidFill>
               </a:rPr>
               <a:pPr/>
-              <a:t>9/14/2016</a:t>
+              <a:t>9/30/2016</a:t>
             </a:fld>
             <a:endParaRPr lang="en-US">
               <a:solidFill>
@@ -2630,7 +2630,7 @@
                 </a:solidFill>
               </a:rPr>
               <a:pPr/>
-              <a:t>9/14/2016</a:t>
+              <a:t>9/30/2016</a:t>
             </a:fld>
             <a:endParaRPr lang="en-US">
               <a:solidFill>
@@ -2939,7 +2939,7 @@
                 </a:solidFill>
               </a:rPr>
               <a:pPr/>
-              <a:t>9/14/2016</a:t>
+              <a:t>9/30/2016</a:t>
             </a:fld>
             <a:endParaRPr lang="en-US">
               <a:solidFill>
@@ -3134,7 +3134,7 @@
           <a:p>
             <a:fld id="{8477DB91-D4F4-47C0-BB7C-05B39326A595}" type="datetimeFigureOut">
               <a:rPr lang="de-CH" smtClean="0"/>
-              <a:t>14.09.2016</a:t>
+              <a:t>30.09.2016</a:t>
             </a:fld>
             <a:endParaRPr lang="de-CH"/>
           </a:p>
@@ -3394,7 +3394,7 @@
                 </a:solidFill>
               </a:rPr>
               <a:pPr/>
-              <a:t>9/14/2016</a:t>
+              <a:t>9/30/2016</a:t>
             </a:fld>
             <a:endParaRPr lang="en-US">
               <a:solidFill>
@@ -3596,7 +3596,7 @@
                 </a:solidFill>
               </a:rPr>
               <a:pPr/>
-              <a:t>9/14/2016</a:t>
+              <a:t>9/30/2016</a:t>
             </a:fld>
             <a:endParaRPr lang="en-US">
               <a:solidFill>
@@ -3808,7 +3808,7 @@
                 </a:solidFill>
               </a:rPr>
               <a:pPr/>
-              <a:t>9/14/2016</a:t>
+              <a:t>9/30/2016</a:t>
             </a:fld>
             <a:endParaRPr lang="en-US">
               <a:solidFill>
@@ -4079,7 +4079,7 @@
           <a:p>
             <a:fld id="{8477DB91-D4F4-47C0-BB7C-05B39326A595}" type="datetimeFigureOut">
               <a:rPr lang="de-CH" smtClean="0"/>
-              <a:t>14.09.2016</a:t>
+              <a:t>30.09.2016</a:t>
             </a:fld>
             <a:endParaRPr lang="de-CH"/>
           </a:p>
@@ -4367,7 +4367,7 @@
           <a:p>
             <a:fld id="{8477DB91-D4F4-47C0-BB7C-05B39326A595}" type="datetimeFigureOut">
               <a:rPr lang="de-CH" smtClean="0"/>
-              <a:t>14.09.2016</a:t>
+              <a:t>30.09.2016</a:t>
             </a:fld>
             <a:endParaRPr lang="de-CH"/>
           </a:p>
@@ -4789,7 +4789,7 @@
           <a:p>
             <a:fld id="{8477DB91-D4F4-47C0-BB7C-05B39326A595}" type="datetimeFigureOut">
               <a:rPr lang="de-CH" smtClean="0"/>
-              <a:t>14.09.2016</a:t>
+              <a:t>30.09.2016</a:t>
             </a:fld>
             <a:endParaRPr lang="de-CH"/>
           </a:p>
@@ -4907,7 +4907,7 @@
           <a:p>
             <a:fld id="{8477DB91-D4F4-47C0-BB7C-05B39326A595}" type="datetimeFigureOut">
               <a:rPr lang="de-CH" smtClean="0"/>
-              <a:t>14.09.2016</a:t>
+              <a:t>30.09.2016</a:t>
             </a:fld>
             <a:endParaRPr lang="de-CH"/>
           </a:p>
@@ -5002,7 +5002,7 @@
           <a:p>
             <a:fld id="{8477DB91-D4F4-47C0-BB7C-05B39326A595}" type="datetimeFigureOut">
               <a:rPr lang="de-CH" smtClean="0"/>
-              <a:t>14.09.2016</a:t>
+              <a:t>30.09.2016</a:t>
             </a:fld>
             <a:endParaRPr lang="de-CH"/>
           </a:p>
@@ -5279,7 +5279,7 @@
           <a:p>
             <a:fld id="{8477DB91-D4F4-47C0-BB7C-05B39326A595}" type="datetimeFigureOut">
               <a:rPr lang="de-CH" smtClean="0"/>
-              <a:t>14.09.2016</a:t>
+              <a:t>30.09.2016</a:t>
             </a:fld>
             <a:endParaRPr lang="de-CH"/>
           </a:p>
@@ -5532,7 +5532,7 @@
           <a:p>
             <a:fld id="{8477DB91-D4F4-47C0-BB7C-05B39326A595}" type="datetimeFigureOut">
               <a:rPr lang="de-CH" smtClean="0"/>
-              <a:t>14.09.2016</a:t>
+              <a:t>30.09.2016</a:t>
             </a:fld>
             <a:endParaRPr lang="de-CH"/>
           </a:p>
@@ -5745,7 +5745,7 @@
           <a:p>
             <a:fld id="{8477DB91-D4F4-47C0-BB7C-05B39326A595}" type="datetimeFigureOut">
               <a:rPr lang="de-CH" smtClean="0"/>
-              <a:t>14.09.2016</a:t>
+              <a:t>30.09.2016</a:t>
             </a:fld>
             <a:endParaRPr lang="de-CH"/>
           </a:p>
@@ -6262,7 +6262,7 @@
                 </a:solidFill>
               </a:rPr>
               <a:pPr/>
-              <a:t>9/14/2016</a:t>
+              <a:t>9/30/2016</a:t>
             </a:fld>
             <a:endParaRPr lang="en-US">
               <a:solidFill>
@@ -10461,11 +10461,6 @@
                 </a:rPr>
                 <a:t>g2</a:t>
               </a:r>
-              <a:endParaRPr lang="de-CH" sz="1050" dirty="0">
-                <a:solidFill>
-                  <a:prstClr val="white"/>
-                </a:solidFill>
-              </a:endParaRPr>
             </a:p>
           </p:txBody>
         </p:sp>
@@ -10512,15 +10507,7 @@
                     <a:prstClr val="black"/>
                   </a:solidFill>
                 </a:rPr>
-                <a:t>Feature 6 is not </a:t>
-              </a:r>
-              <a:r>
-                <a:rPr lang="de-DE" sz="825" dirty="0">
-                  <a:solidFill>
-                    <a:prstClr val="black"/>
-                  </a:solidFill>
-                </a:rPr>
-                <a:t>included at this level of detail</a:t>
+                <a:t>Feature 6 is not included at this level of detail</a:t>
               </a:r>
               <a:endParaRPr lang="de-CH" sz="825" dirty="0">
                 <a:solidFill>
@@ -11473,15 +11460,7 @@
                     <a:prstClr val="white"/>
                   </a:solidFill>
                 </a:rPr>
-                <a:t>         /</a:t>
-              </a:r>
-              <a:r>
-                <a:rPr lang="de-DE" sz="1350" dirty="0">
-                  <a:solidFill>
-                    <a:prstClr val="white"/>
-                  </a:solidFill>
-                </a:rPr>
-                <a:t>nodes/1-4-2-0/</a:t>
+                <a:t>         /nodes/1-4-2-0/</a:t>
               </a:r>
               <a:endParaRPr lang="de-CH" sz="1350" dirty="0">
                 <a:solidFill>
@@ -11711,15 +11690,7 @@
                     <a:prstClr val="white"/>
                   </a:solidFill>
                 </a:rPr>
-                <a:t>geometries/ </a:t>
-              </a:r>
-              <a:r>
-                <a:rPr lang="de-DE" sz="1350" dirty="0">
-                  <a:solidFill>
-                    <a:prstClr val="white"/>
-                  </a:solidFill>
-                </a:rPr>
-                <a:t>0.bin.gz</a:t>
+                <a:t>geometries/ 0.bin.gz</a:t>
               </a:r>
               <a:endParaRPr lang="de-CH" sz="1350" dirty="0">
                 <a:solidFill>
@@ -11826,23 +11797,28 @@
                 <a:t>textures/ </a:t>
               </a:r>
               <a:r>
-                <a:rPr lang="de-DE" sz="1350" dirty="0">
+                <a:rPr lang="de-DE" sz="1350" dirty="0" smtClean="0">
                   <a:solidFill>
                     <a:prstClr val="white"/>
                   </a:solidFill>
                 </a:rPr>
-                <a:t>0_0.bin,</a:t>
+                <a:t>0_0.jpeg,</a:t>
               </a:r>
+              <a:endParaRPr lang="de-DE" sz="1350" dirty="0">
+                <a:solidFill>
+                  <a:prstClr val="white"/>
+                </a:solidFill>
+              </a:endParaRPr>
             </a:p>
             <a:p>
               <a:pPr algn="ctr"/>
               <a:r>
-                <a:rPr lang="de-CH" sz="1350" dirty="0">
+                <a:rPr lang="de-CH" sz="1350" dirty="0" smtClean="0">
                   <a:solidFill>
                     <a:prstClr val="white"/>
                   </a:solidFill>
                 </a:rPr>
-                <a:t>0_0_1.bin.gz</a:t>
+                <a:t>0_0_1.dds.gz</a:t>
               </a:r>
               <a:endParaRPr lang="de-CH" sz="1350" dirty="0">
                 <a:solidFill>

</xml_diff>

<commit_message>
added vendors and updated SLPK diagram
</commit_message>
<xml_diff>
--- a/format/uml/SpecificationFigures.pptx
+++ b/format/uml/SpecificationFigures.pptx
@@ -212,7 +212,7 @@
           <a:p>
             <a:fld id="{DBD45C97-1077-4622-A936-229BE89647D5}" type="datetimeFigureOut">
               <a:rPr lang="de-CH" smtClean="0"/>
-              <a:t>30.09.2016</a:t>
+              <a:t>20.10.2016</a:t>
             </a:fld>
             <a:endParaRPr lang="de-CH"/>
           </a:p>
@@ -661,7 +661,7 @@
           <a:p>
             <a:fld id="{8477DB91-D4F4-47C0-BB7C-05B39326A595}" type="datetimeFigureOut">
               <a:rPr lang="de-CH" smtClean="0"/>
-              <a:t>30.09.2016</a:t>
+              <a:t>20.10.2016</a:t>
             </a:fld>
             <a:endParaRPr lang="de-CH"/>
           </a:p>
@@ -831,7 +831,7 @@
           <a:p>
             <a:fld id="{8477DB91-D4F4-47C0-BB7C-05B39326A595}" type="datetimeFigureOut">
               <a:rPr lang="de-CH" smtClean="0"/>
-              <a:t>30.09.2016</a:t>
+              <a:t>20.10.2016</a:t>
             </a:fld>
             <a:endParaRPr lang="de-CH"/>
           </a:p>
@@ -1011,7 +1011,7 @@
           <a:p>
             <a:fld id="{8477DB91-D4F4-47C0-BB7C-05B39326A595}" type="datetimeFigureOut">
               <a:rPr lang="de-CH" smtClean="0"/>
-              <a:t>30.09.2016</a:t>
+              <a:t>20.10.2016</a:t>
             </a:fld>
             <a:endParaRPr lang="de-CH"/>
           </a:p>
@@ -1210,7 +1210,7 @@
                 </a:solidFill>
               </a:rPr>
               <a:pPr/>
-              <a:t>9/30/2016</a:t>
+              <a:t>10/20/2016</a:t>
             </a:fld>
             <a:endParaRPr lang="en-US">
               <a:solidFill>
@@ -1412,7 +1412,7 @@
                 </a:solidFill>
               </a:rPr>
               <a:pPr/>
-              <a:t>9/30/2016</a:t>
+              <a:t>10/20/2016</a:t>
             </a:fld>
             <a:endParaRPr lang="en-US">
               <a:solidFill>
@@ -1690,7 +1690,7 @@
                 </a:solidFill>
               </a:rPr>
               <a:pPr/>
-              <a:t>9/30/2016</a:t>
+              <a:t>10/20/2016</a:t>
             </a:fld>
             <a:endParaRPr lang="en-US">
               <a:solidFill>
@@ -1954,7 +1954,7 @@
                 </a:solidFill>
               </a:rPr>
               <a:pPr/>
-              <a:t>9/30/2016</a:t>
+              <a:t>10/20/2016</a:t>
             </a:fld>
             <a:endParaRPr lang="en-US">
               <a:solidFill>
@@ -2353,7 +2353,7 @@
                 </a:solidFill>
               </a:rPr>
               <a:pPr/>
-              <a:t>9/30/2016</a:t>
+              <a:t>10/20/2016</a:t>
             </a:fld>
             <a:endParaRPr lang="en-US">
               <a:solidFill>
@@ -2503,7 +2503,7 @@
                 </a:solidFill>
               </a:rPr>
               <a:pPr/>
-              <a:t>9/30/2016</a:t>
+              <a:t>10/20/2016</a:t>
             </a:fld>
             <a:endParaRPr lang="en-US">
               <a:solidFill>
@@ -2630,7 +2630,7 @@
                 </a:solidFill>
               </a:rPr>
               <a:pPr/>
-              <a:t>9/30/2016</a:t>
+              <a:t>10/20/2016</a:t>
             </a:fld>
             <a:endParaRPr lang="en-US">
               <a:solidFill>
@@ -2939,7 +2939,7 @@
                 </a:solidFill>
               </a:rPr>
               <a:pPr/>
-              <a:t>9/30/2016</a:t>
+              <a:t>10/20/2016</a:t>
             </a:fld>
             <a:endParaRPr lang="en-US">
               <a:solidFill>
@@ -3134,7 +3134,7 @@
           <a:p>
             <a:fld id="{8477DB91-D4F4-47C0-BB7C-05B39326A595}" type="datetimeFigureOut">
               <a:rPr lang="de-CH" smtClean="0"/>
-              <a:t>30.09.2016</a:t>
+              <a:t>20.10.2016</a:t>
             </a:fld>
             <a:endParaRPr lang="de-CH"/>
           </a:p>
@@ -3394,7 +3394,7 @@
                 </a:solidFill>
               </a:rPr>
               <a:pPr/>
-              <a:t>9/30/2016</a:t>
+              <a:t>10/20/2016</a:t>
             </a:fld>
             <a:endParaRPr lang="en-US">
               <a:solidFill>
@@ -3596,7 +3596,7 @@
                 </a:solidFill>
               </a:rPr>
               <a:pPr/>
-              <a:t>9/30/2016</a:t>
+              <a:t>10/20/2016</a:t>
             </a:fld>
             <a:endParaRPr lang="en-US">
               <a:solidFill>
@@ -3808,7 +3808,7 @@
                 </a:solidFill>
               </a:rPr>
               <a:pPr/>
-              <a:t>9/30/2016</a:t>
+              <a:t>10/20/2016</a:t>
             </a:fld>
             <a:endParaRPr lang="en-US">
               <a:solidFill>
@@ -4079,7 +4079,7 @@
           <a:p>
             <a:fld id="{8477DB91-D4F4-47C0-BB7C-05B39326A595}" type="datetimeFigureOut">
               <a:rPr lang="de-CH" smtClean="0"/>
-              <a:t>30.09.2016</a:t>
+              <a:t>20.10.2016</a:t>
             </a:fld>
             <a:endParaRPr lang="de-CH"/>
           </a:p>
@@ -4367,7 +4367,7 @@
           <a:p>
             <a:fld id="{8477DB91-D4F4-47C0-BB7C-05B39326A595}" type="datetimeFigureOut">
               <a:rPr lang="de-CH" smtClean="0"/>
-              <a:t>30.09.2016</a:t>
+              <a:t>20.10.2016</a:t>
             </a:fld>
             <a:endParaRPr lang="de-CH"/>
           </a:p>
@@ -4789,7 +4789,7 @@
           <a:p>
             <a:fld id="{8477DB91-D4F4-47C0-BB7C-05B39326A595}" type="datetimeFigureOut">
               <a:rPr lang="de-CH" smtClean="0"/>
-              <a:t>30.09.2016</a:t>
+              <a:t>20.10.2016</a:t>
             </a:fld>
             <a:endParaRPr lang="de-CH"/>
           </a:p>
@@ -4907,7 +4907,7 @@
           <a:p>
             <a:fld id="{8477DB91-D4F4-47C0-BB7C-05B39326A595}" type="datetimeFigureOut">
               <a:rPr lang="de-CH" smtClean="0"/>
-              <a:t>30.09.2016</a:t>
+              <a:t>20.10.2016</a:t>
             </a:fld>
             <a:endParaRPr lang="de-CH"/>
           </a:p>
@@ -5002,7 +5002,7 @@
           <a:p>
             <a:fld id="{8477DB91-D4F4-47C0-BB7C-05B39326A595}" type="datetimeFigureOut">
               <a:rPr lang="de-CH" smtClean="0"/>
-              <a:t>30.09.2016</a:t>
+              <a:t>20.10.2016</a:t>
             </a:fld>
             <a:endParaRPr lang="de-CH"/>
           </a:p>
@@ -5279,7 +5279,7 @@
           <a:p>
             <a:fld id="{8477DB91-D4F4-47C0-BB7C-05B39326A595}" type="datetimeFigureOut">
               <a:rPr lang="de-CH" smtClean="0"/>
-              <a:t>30.09.2016</a:t>
+              <a:t>20.10.2016</a:t>
             </a:fld>
             <a:endParaRPr lang="de-CH"/>
           </a:p>
@@ -5532,7 +5532,7 @@
           <a:p>
             <a:fld id="{8477DB91-D4F4-47C0-BB7C-05B39326A595}" type="datetimeFigureOut">
               <a:rPr lang="de-CH" smtClean="0"/>
-              <a:t>30.09.2016</a:t>
+              <a:t>20.10.2016</a:t>
             </a:fld>
             <a:endParaRPr lang="de-CH"/>
           </a:p>
@@ -5745,7 +5745,7 @@
           <a:p>
             <a:fld id="{8477DB91-D4F4-47C0-BB7C-05B39326A595}" type="datetimeFigureOut">
               <a:rPr lang="de-CH" smtClean="0"/>
-              <a:t>30.09.2016</a:t>
+              <a:t>20.10.2016</a:t>
             </a:fld>
             <a:endParaRPr lang="de-CH"/>
           </a:p>
@@ -6262,7 +6262,7 @@
                 </a:solidFill>
               </a:rPr>
               <a:pPr/>
-              <a:t>9/30/2016</a:t>
+              <a:t>10/20/2016</a:t>
             </a:fld>
             <a:endParaRPr lang="en-US">
               <a:solidFill>
@@ -11530,8 +11530,8 @@
           </p:nvSpPr>
           <p:spPr>
             <a:xfrm>
-              <a:off x="6358006" y="5034398"/>
-              <a:ext cx="1804012" cy="926181"/>
+              <a:off x="6401790" y="5033745"/>
+              <a:ext cx="1760228" cy="926181"/>
             </a:xfrm>
             <a:prstGeom prst="rect">
               <a:avLst/>
@@ -11582,7 +11582,7 @@
           </p:nvSpPr>
           <p:spPr>
             <a:xfrm>
-              <a:off x="8264854" y="5033744"/>
+              <a:off x="8264854" y="5033745"/>
               <a:ext cx="2534333" cy="927017"/>
             </a:xfrm>
             <a:prstGeom prst="rect">
@@ -11657,8 +11657,8 @@
           </p:nvSpPr>
           <p:spPr>
             <a:xfrm>
-              <a:off x="1438934" y="5040615"/>
-              <a:ext cx="1455215" cy="918251"/>
+              <a:off x="1438935" y="5033745"/>
+              <a:ext cx="1405329" cy="918251"/>
             </a:xfrm>
             <a:prstGeom prst="rect">
               <a:avLst/>
@@ -11708,8 +11708,8 @@
           </p:nvSpPr>
           <p:spPr>
             <a:xfrm>
-              <a:off x="4754193" y="5041718"/>
-              <a:ext cx="1433403" cy="927017"/>
+              <a:off x="4943872" y="5033745"/>
+              <a:ext cx="1339735" cy="927017"/>
             </a:xfrm>
             <a:prstGeom prst="rect">
               <a:avLst/>
@@ -11760,8 +11760,8 @@
           </p:nvSpPr>
           <p:spPr>
             <a:xfrm>
-              <a:off x="3017292" y="5047755"/>
-              <a:ext cx="1613756" cy="914129"/>
+              <a:off x="2947101" y="5033745"/>
+              <a:ext cx="1900760" cy="914129"/>
             </a:xfrm>
             <a:prstGeom prst="rect">
               <a:avLst/>
@@ -11818,7 +11818,7 @@
                     <a:prstClr val="white"/>
                   </a:solidFill>
                 </a:rPr>
-                <a:t>0_0_1.dds.gz</a:t>
+                <a:t>0_0_1.bin.dds.gz</a:t>
               </a:r>
               <a:endParaRPr lang="de-CH" sz="1350" dirty="0">
                 <a:solidFill>

</xml_diff>